<commit_message>
updated to pull data from city API instead of static csv stored locally
</commit_message>
<xml_diff>
--- a/Presentation.pptx
+++ b/Presentation.pptx
@@ -6,10 +6,11 @@
   </p:sldMasterIdLst>
   <p:sldIdLst>
     <p:sldId id="256" r:id="rId2"/>
-    <p:sldId id="257" r:id="rId3"/>
-    <p:sldId id="258" r:id="rId4"/>
-    <p:sldId id="259" r:id="rId5"/>
-    <p:sldId id="260" r:id="rId6"/>
+    <p:sldId id="261" r:id="rId3"/>
+    <p:sldId id="257" r:id="rId4"/>
+    <p:sldId id="258" r:id="rId5"/>
+    <p:sldId id="259" r:id="rId6"/>
+    <p:sldId id="260" r:id="rId7"/>
   </p:sldIdLst>
   <p:sldSz cx="12192000" cy="6858000"/>
   <p:notesSz cx="6858000" cy="9144000"/>
@@ -3456,12 +3457,12 @@
           <a:lstStyle/>
           <a:p>
             <a:r>
-              <a:rPr lang="en-US">
+              <a:rPr lang="en-US" dirty="0">
                 <a:solidFill>
                   <a:srgbClr val="FFFFFF"/>
                 </a:solidFill>
               </a:rPr>
-              <a:t>Chicago Restaurant</a:t>
+              <a:t>Restaurant Classification</a:t>
             </a:r>
           </a:p>
         </p:txBody>
@@ -3494,7 +3495,7 @@
           </a:bodyPr>
           <a:lstStyle/>
           <a:p>
-            <a:endParaRPr lang="en-US">
+            <a:endParaRPr lang="en-US" dirty="0">
               <a:solidFill>
                 <a:srgbClr val="FFFFFF"/>
               </a:solidFill>
@@ -3537,7 +3538,7 @@
           <p:cNvPr id="2" name="Title 1">
             <a:extLst>
               <a:ext uri="{FF2B5EF4-FFF2-40B4-BE49-F238E27FC236}">
-                <a16:creationId xmlns:a16="http://schemas.microsoft.com/office/drawing/2014/main" id="{B93231E6-0738-554E-8C12-14B283899572}"/>
+                <a16:creationId xmlns:a16="http://schemas.microsoft.com/office/drawing/2014/main" id="{6085E475-C0F4-4245-BDE8-D4AD65E1967A}"/>
               </a:ext>
             </a:extLst>
           </p:cNvPr>
@@ -3565,7 +3566,7 @@
           <p:cNvPr id="3" name="Content Placeholder 2">
             <a:extLst>
               <a:ext uri="{FF2B5EF4-FFF2-40B4-BE49-F238E27FC236}">
-                <a16:creationId xmlns:a16="http://schemas.microsoft.com/office/drawing/2014/main" id="{2A7FAEBC-C3F1-5A40-B6F5-541625A93548}"/>
+                <a16:creationId xmlns:a16="http://schemas.microsoft.com/office/drawing/2014/main" id="{C8BD5E33-80E6-E545-B6B4-DB58A9D90650}"/>
               </a:ext>
             </a:extLst>
           </p:cNvPr>
@@ -3578,50 +3579,81 @@
         </p:nvSpPr>
         <p:spPr/>
         <p:txBody>
-          <a:bodyPr/>
-          <a:lstStyle/>
-          <a:p>
-            <a:r>
-              <a:rPr lang="en-US" dirty="0"/>
-              <a:t>Introduction</a:t>
-            </a:r>
-          </a:p>
-          <a:p>
-            <a:r>
-              <a:rPr lang="en-US" dirty="0"/>
-              <a:t>Data</a:t>
-            </a:r>
-          </a:p>
-          <a:p>
-            <a:r>
-              <a:rPr lang="en-US" dirty="0"/>
-              <a:t>Natural Language Processing</a:t>
-            </a:r>
-          </a:p>
-          <a:p>
-            <a:r>
-              <a:rPr lang="en-US" dirty="0"/>
-              <a:t>Classification</a:t>
-            </a:r>
-          </a:p>
-          <a:p>
-            <a:r>
-              <a:rPr lang="en-US" dirty="0"/>
-              <a:t>Model Results</a:t>
-            </a:r>
-          </a:p>
-          <a:p>
-            <a:r>
-              <a:rPr lang="en-US" dirty="0"/>
-              <a:t>Summary</a:t>
-            </a:r>
+          <a:bodyPr>
+            <a:normAutofit/>
+          </a:bodyPr>
+          <a:lstStyle/>
+          <a:p>
+            <a:pPr marL="0" indent="0">
+              <a:buNone/>
+            </a:pPr>
+            <a:r>
+              <a:rPr lang="en-US" sz="2400" dirty="0"/>
+              <a:t>The goal is to apply Natural Language Processing and Machine Learning to build a </a:t>
+            </a:r>
+            <a:r>
+              <a:rPr lang="en-US" sz="2400" b="1" dirty="0"/>
+              <a:t>multinomial classification model</a:t>
+            </a:r>
+            <a:r>
+              <a:rPr lang="en-US" sz="2400" dirty="0"/>
+              <a:t>. This model will predict the results of a food inspection based on the inspector’s comments. </a:t>
+            </a:r>
+          </a:p>
+          <a:p>
+            <a:pPr marL="0" indent="0">
+              <a:buNone/>
+            </a:pPr>
+            <a:endParaRPr lang="en-US" sz="2400" dirty="0"/>
+          </a:p>
+          <a:p>
+            <a:pPr marL="0" indent="0">
+              <a:buNone/>
+            </a:pPr>
+            <a:r>
+              <a:rPr lang="en-US" sz="2400" dirty="0"/>
+              <a:t>As a result, the model will only consider the inspector’s comments. Other features, such as location, business type, and risk factor, will not be included.</a:t>
+            </a:r>
+          </a:p>
+          <a:p>
+            <a:pPr marL="0" indent="0">
+              <a:buNone/>
+            </a:pPr>
+            <a:endParaRPr lang="en-US" sz="2400" dirty="0"/>
+          </a:p>
+          <a:p>
+            <a:pPr marL="0" indent="0">
+              <a:buNone/>
+            </a:pPr>
+            <a:r>
+              <a:rPr lang="en-US" sz="2400" dirty="0"/>
+              <a:t>The data source is provided by the City of Chicago Health and Human Services and is for the timeframe (____)</a:t>
+            </a:r>
+          </a:p>
+          <a:p>
+            <a:pPr marL="0" indent="0">
+              <a:buNone/>
+            </a:pPr>
+            <a:endParaRPr lang="en-US" sz="2400" dirty="0"/>
+          </a:p>
+          <a:p>
+            <a:pPr marL="0" indent="0">
+              <a:buNone/>
+            </a:pPr>
+            <a:endParaRPr lang="en-US" sz="2400" dirty="0"/>
+          </a:p>
+          <a:p>
+            <a:pPr marL="0" indent="0">
+              <a:buNone/>
+            </a:pPr>
+            <a:endParaRPr lang="en-US" sz="2400" dirty="0"/>
           </a:p>
         </p:txBody>
       </p:sp>
     </p:spTree>
     <p:extLst>
       <p:ext uri="{BB962C8B-B14F-4D97-AF65-F5344CB8AC3E}">
-        <p14:creationId xmlns:p14="http://schemas.microsoft.com/office/powerpoint/2010/main" val="3233333404"/>
+        <p14:creationId xmlns:p14="http://schemas.microsoft.com/office/powerpoint/2010/main" val="29741159"/>
       </p:ext>
     </p:extLst>
   </p:cSld>
@@ -3653,7 +3685,7 @@
           <p:cNvPr id="2" name="Title 1">
             <a:extLst>
               <a:ext uri="{FF2B5EF4-FFF2-40B4-BE49-F238E27FC236}">
-                <a16:creationId xmlns:a16="http://schemas.microsoft.com/office/drawing/2014/main" id="{F12B0F1A-B09E-4D4D-A2B3-344630841D9D}"/>
+                <a16:creationId xmlns:a16="http://schemas.microsoft.com/office/drawing/2014/main" id="{B93231E6-0738-554E-8C12-14B283899572}"/>
               </a:ext>
             </a:extLst>
           </p:cNvPr>
@@ -3669,7 +3701,10 @@
           <a:bodyPr/>
           <a:lstStyle/>
           <a:p>
-            <a:endParaRPr lang="en-US" dirty="0"/>
+            <a:r>
+              <a:rPr lang="en-US" dirty="0"/>
+              <a:t>Overview</a:t>
+            </a:r>
           </a:p>
         </p:txBody>
       </p:sp>
@@ -3678,7 +3713,7 @@
           <p:cNvPr id="3" name="Content Placeholder 2">
             <a:extLst>
               <a:ext uri="{FF2B5EF4-FFF2-40B4-BE49-F238E27FC236}">
-                <a16:creationId xmlns:a16="http://schemas.microsoft.com/office/drawing/2014/main" id="{15C79D84-5CFC-6F45-BA69-E1CFCE67DA6D}"/>
+                <a16:creationId xmlns:a16="http://schemas.microsoft.com/office/drawing/2014/main" id="{2A7FAEBC-C3F1-5A40-B6F5-541625A93548}"/>
               </a:ext>
             </a:extLst>
           </p:cNvPr>
@@ -3694,14 +3729,47 @@
           <a:bodyPr/>
           <a:lstStyle/>
           <a:p>
-            <a:endParaRPr lang="en-US"/>
+            <a:r>
+              <a:rPr lang="en-US" dirty="0"/>
+              <a:t>Introduction</a:t>
+            </a:r>
+          </a:p>
+          <a:p>
+            <a:r>
+              <a:rPr lang="en-US" dirty="0"/>
+              <a:t>Data</a:t>
+            </a:r>
+          </a:p>
+          <a:p>
+            <a:r>
+              <a:rPr lang="en-US" dirty="0"/>
+              <a:t>Natural Language Processing</a:t>
+            </a:r>
+          </a:p>
+          <a:p>
+            <a:r>
+              <a:rPr lang="en-US" dirty="0"/>
+              <a:t>Classification</a:t>
+            </a:r>
+          </a:p>
+          <a:p>
+            <a:r>
+              <a:rPr lang="en-US" dirty="0"/>
+              <a:t>Model Results</a:t>
+            </a:r>
+          </a:p>
+          <a:p>
+            <a:r>
+              <a:rPr lang="en-US" dirty="0"/>
+              <a:t>Summary</a:t>
+            </a:r>
           </a:p>
         </p:txBody>
       </p:sp>
     </p:spTree>
     <p:extLst>
       <p:ext uri="{BB962C8B-B14F-4D97-AF65-F5344CB8AC3E}">
-        <p14:creationId xmlns:p14="http://schemas.microsoft.com/office/powerpoint/2010/main" val="272077139"/>
+        <p14:creationId xmlns:p14="http://schemas.microsoft.com/office/powerpoint/2010/main" val="3233333404"/>
       </p:ext>
     </p:extLst>
   </p:cSld>
@@ -3733,6 +3801,134 @@
           <p:cNvPr id="2" name="Title 1">
             <a:extLst>
               <a:ext uri="{FF2B5EF4-FFF2-40B4-BE49-F238E27FC236}">
+                <a16:creationId xmlns:a16="http://schemas.microsoft.com/office/drawing/2014/main" id="{F12B0F1A-B09E-4D4D-A2B3-344630841D9D}"/>
+              </a:ext>
+            </a:extLst>
+          </p:cNvPr>
+          <p:cNvSpPr>
+            <a:spLocks noGrp="1"/>
+          </p:cNvSpPr>
+          <p:nvPr>
+            <p:ph type="title"/>
+          </p:nvPr>
+        </p:nvSpPr>
+        <p:spPr/>
+        <p:txBody>
+          <a:bodyPr/>
+          <a:lstStyle/>
+          <a:p>
+            <a:r>
+              <a:rPr lang="en-US" dirty="0"/>
+              <a:t>Data</a:t>
+            </a:r>
+          </a:p>
+        </p:txBody>
+      </p:sp>
+      <p:sp>
+        <p:nvSpPr>
+          <p:cNvPr id="3" name="Content Placeholder 2">
+            <a:extLst>
+              <a:ext uri="{FF2B5EF4-FFF2-40B4-BE49-F238E27FC236}">
+                <a16:creationId xmlns:a16="http://schemas.microsoft.com/office/drawing/2014/main" id="{15C79D84-5CFC-6F45-BA69-E1CFCE67DA6D}"/>
+              </a:ext>
+            </a:extLst>
+          </p:cNvPr>
+          <p:cNvSpPr>
+            <a:spLocks noGrp="1"/>
+          </p:cNvSpPr>
+          <p:nvPr>
+            <p:ph idx="1"/>
+          </p:nvPr>
+        </p:nvSpPr>
+        <p:spPr/>
+        <p:txBody>
+          <a:bodyPr>
+            <a:normAutofit/>
+          </a:bodyPr>
+          <a:lstStyle/>
+          <a:p>
+            <a:pPr marL="0" indent="0">
+              <a:buNone/>
+            </a:pPr>
+            <a:r>
+              <a:rPr lang="en-US" sz="1500" dirty="0"/>
+              <a:t>Source: </a:t>
+            </a:r>
+            <a:r>
+              <a:rPr lang="en-US" sz="1500" dirty="0">
+                <a:hlinkClick r:id="rId2"/>
+              </a:rPr>
+              <a:t>https://data.cityofchicago.org/Health-Human-Services/Food-Inspections/4ijn-s7e5</a:t>
+            </a:r>
+            <a:endParaRPr lang="en-US" sz="1500" dirty="0"/>
+          </a:p>
+        </p:txBody>
+      </p:sp>
+      <p:pic>
+        <p:nvPicPr>
+          <p:cNvPr id="5" name="Picture 4" descr="Text&#10;&#10;Description automatically generated">
+            <a:extLst>
+              <a:ext uri="{FF2B5EF4-FFF2-40B4-BE49-F238E27FC236}">
+                <a16:creationId xmlns:a16="http://schemas.microsoft.com/office/drawing/2014/main" id="{85A4BD39-48D6-884A-B339-D6B9649FFC33}"/>
+              </a:ext>
+            </a:extLst>
+          </p:cNvPr>
+          <p:cNvPicPr>
+            <a:picLocks noChangeAspect="1"/>
+          </p:cNvPicPr>
+          <p:nvPr/>
+        </p:nvPicPr>
+        <p:blipFill>
+          <a:blip r:embed="rId3"/>
+          <a:stretch>
+            <a:fillRect/>
+          </a:stretch>
+        </p:blipFill>
+        <p:spPr>
+          <a:xfrm>
+            <a:off x="838200" y="3202343"/>
+            <a:ext cx="3168192" cy="2845869"/>
+          </a:xfrm>
+          <a:prstGeom prst="rect">
+            <a:avLst/>
+          </a:prstGeom>
+        </p:spPr>
+      </p:pic>
+    </p:spTree>
+    <p:extLst>
+      <p:ext uri="{BB962C8B-B14F-4D97-AF65-F5344CB8AC3E}">
+        <p14:creationId xmlns:p14="http://schemas.microsoft.com/office/powerpoint/2010/main" val="272077139"/>
+      </p:ext>
+    </p:extLst>
+  </p:cSld>
+  <p:clrMapOvr>
+    <a:masterClrMapping/>
+  </p:clrMapOvr>
+</p:sld>
+</file>
+
+<file path=ppt/slides/slide5.xml><?xml version="1.0" encoding="utf-8"?>
+<p:sld xmlns:a="http://schemas.openxmlformats.org/drawingml/2006/main" xmlns:r="http://schemas.openxmlformats.org/officeDocument/2006/relationships" xmlns:p="http://schemas.openxmlformats.org/presentationml/2006/main">
+  <p:cSld>
+    <p:spTree>
+      <p:nvGrpSpPr>
+        <p:cNvPr id="1" name=""/>
+        <p:cNvGrpSpPr/>
+        <p:nvPr/>
+      </p:nvGrpSpPr>
+      <p:grpSpPr>
+        <a:xfrm>
+          <a:off x="0" y="0"/>
+          <a:ext cx="0" cy="0"/>
+          <a:chOff x="0" y="0"/>
+          <a:chExt cx="0" cy="0"/>
+        </a:xfrm>
+      </p:grpSpPr>
+      <p:sp>
+        <p:nvSpPr>
+          <p:cNvPr id="2" name="Title 1">
+            <a:extLst>
+              <a:ext uri="{FF2B5EF4-FFF2-40B4-BE49-F238E27FC236}">
                 <a16:creationId xmlns:a16="http://schemas.microsoft.com/office/drawing/2014/main" id="{B3B1DFEA-7CDA-9C43-8F18-DA6A29B0D8D3}"/>
               </a:ext>
             </a:extLst>
@@ -3744,40 +3940,52 @@
             <p:ph type="title"/>
           </p:nvPr>
         </p:nvSpPr>
-        <p:spPr/>
-        <p:txBody>
-          <a:bodyPr/>
-          <a:lstStyle/>
-          <a:p>
-            <a:endParaRPr lang="en-US"/>
-          </a:p>
-        </p:txBody>
-      </p:sp>
-      <p:sp>
-        <p:nvSpPr>
-          <p:cNvPr id="3" name="Content Placeholder 2">
-            <a:extLst>
-              <a:ext uri="{FF2B5EF4-FFF2-40B4-BE49-F238E27FC236}">
-                <a16:creationId xmlns:a16="http://schemas.microsoft.com/office/drawing/2014/main" id="{79379B1C-69F7-784B-A123-7F4B0BF8DC90}"/>
-              </a:ext>
-            </a:extLst>
-          </p:cNvPr>
-          <p:cNvSpPr>
-            <a:spLocks noGrp="1"/>
-          </p:cNvSpPr>
+        <p:spPr>
+          <a:xfrm>
+            <a:off x="838200" y="365125"/>
+            <a:ext cx="10515600" cy="1325563"/>
+          </a:xfrm>
+        </p:spPr>
+        <p:txBody>
+          <a:bodyPr/>
+          <a:lstStyle/>
+          <a:p>
+            <a:r>
+              <a:rPr lang="en-US" dirty="0"/>
+              <a:t>Model Overview	</a:t>
+            </a:r>
+          </a:p>
+        </p:txBody>
+      </p:sp>
+      <p:pic>
+        <p:nvPicPr>
+          <p:cNvPr id="5" name="Content Placeholder 4" descr="Graphical user interface, application&#10;&#10;Description automatically generated">
+            <a:extLst>
+              <a:ext uri="{FF2B5EF4-FFF2-40B4-BE49-F238E27FC236}">
+                <a16:creationId xmlns:a16="http://schemas.microsoft.com/office/drawing/2014/main" id="{4641293C-ACDE-B544-9972-29D8A769C5DD}"/>
+              </a:ext>
+            </a:extLst>
+          </p:cNvPr>
+          <p:cNvPicPr>
+            <a:picLocks noGrp="1" noChangeAspect="1"/>
+          </p:cNvPicPr>
           <p:nvPr>
             <p:ph idx="1"/>
           </p:nvPr>
-        </p:nvSpPr>
-        <p:spPr/>
-        <p:txBody>
-          <a:bodyPr/>
-          <a:lstStyle/>
-          <a:p>
-            <a:endParaRPr lang="en-US"/>
-          </a:p>
-        </p:txBody>
-      </p:sp>
+        </p:nvPicPr>
+        <p:blipFill>
+          <a:blip r:embed="rId2"/>
+          <a:stretch>
+            <a:fillRect/>
+          </a:stretch>
+        </p:blipFill>
+        <p:spPr>
+          <a:xfrm>
+            <a:off x="838200" y="2065905"/>
+            <a:ext cx="2451755" cy="1720797"/>
+          </a:xfrm>
+        </p:spPr>
+      </p:pic>
     </p:spTree>
     <p:extLst>
       <p:ext uri="{BB962C8B-B14F-4D97-AF65-F5344CB8AC3E}">
@@ -3791,7 +3999,7 @@
 </p:sld>
 </file>
 
-<file path=ppt/slides/slide5.xml><?xml version="1.0" encoding="utf-8"?>
+<file path=ppt/slides/slide6.xml><?xml version="1.0" encoding="utf-8"?>
 <p:sld xmlns:a="http://schemas.openxmlformats.org/drawingml/2006/main" xmlns:r="http://schemas.openxmlformats.org/officeDocument/2006/relationships" xmlns:p="http://schemas.openxmlformats.org/presentationml/2006/main">
   <p:cSld>
     <p:spTree>

</xml_diff>

<commit_message>
notebook updates, and presentation updates
</commit_message>
<xml_diff>
--- a/Presentation.pptx
+++ b/Presentation.pptx
@@ -4,6 +4,9 @@
   <p:sldMasterIdLst>
     <p:sldMasterId id="2147483830" r:id="rId1"/>
   </p:sldMasterIdLst>
+  <p:notesMasterIdLst>
+    <p:notesMasterId r:id="rId12"/>
+  </p:notesMasterIdLst>
   <p:sldIdLst>
     <p:sldId id="256" r:id="rId2"/>
     <p:sldId id="257" r:id="rId3"/>
@@ -13,6 +16,8 @@
     <p:sldId id="259" r:id="rId7"/>
     <p:sldId id="263" r:id="rId8"/>
     <p:sldId id="260" r:id="rId9"/>
+    <p:sldId id="264" r:id="rId10"/>
+    <p:sldId id="265" r:id="rId11"/>
   </p:sldIdLst>
   <p:sldSz cx="12192000" cy="6858000"/>
   <p:notesSz cx="6858000" cy="9144000"/>
@@ -111,7 +116,445 @@
       </a:defRPr>
     </a:lvl9pPr>
   </p:defaultTextStyle>
+  <p:extLst>
+    <p:ext uri="{EFAFB233-063F-42B5-8137-9DF3F51BA10A}">
+      <p15:sldGuideLst xmlns:p15="http://schemas.microsoft.com/office/powerpoint/2012/main"/>
+    </p:ext>
+  </p:extLst>
 </p:presentation>
+</file>
+
+<file path=ppt/notesMasters/notesMaster1.xml><?xml version="1.0" encoding="utf-8"?>
+<p:notesMaster xmlns:a="http://schemas.openxmlformats.org/drawingml/2006/main" xmlns:r="http://schemas.openxmlformats.org/officeDocument/2006/relationships" xmlns:p="http://schemas.openxmlformats.org/presentationml/2006/main">
+  <p:cSld>
+    <p:bg>
+      <p:bgRef idx="1001">
+        <a:schemeClr val="bg1"/>
+      </p:bgRef>
+    </p:bg>
+    <p:spTree>
+      <p:nvGrpSpPr>
+        <p:cNvPr id="1" name=""/>
+        <p:cNvGrpSpPr/>
+        <p:nvPr/>
+      </p:nvGrpSpPr>
+      <p:grpSpPr>
+        <a:xfrm>
+          <a:off x="0" y="0"/>
+          <a:ext cx="0" cy="0"/>
+          <a:chOff x="0" y="0"/>
+          <a:chExt cx="0" cy="0"/>
+        </a:xfrm>
+      </p:grpSpPr>
+      <p:sp>
+        <p:nvSpPr>
+          <p:cNvPr id="2" name="Header Placeholder 1"/>
+          <p:cNvSpPr>
+            <a:spLocks noGrp="1"/>
+          </p:cNvSpPr>
+          <p:nvPr>
+            <p:ph type="hdr" sz="quarter"/>
+          </p:nvPr>
+        </p:nvSpPr>
+        <p:spPr>
+          <a:xfrm>
+            <a:off x="0" y="0"/>
+            <a:ext cx="2971800" cy="458788"/>
+          </a:xfrm>
+          <a:prstGeom prst="rect">
+            <a:avLst/>
+          </a:prstGeom>
+        </p:spPr>
+        <p:txBody>
+          <a:bodyPr vert="horz" lIns="91440" tIns="45720" rIns="91440" bIns="45720" rtlCol="0"/>
+          <a:lstStyle>
+            <a:lvl1pPr algn="l">
+              <a:defRPr sz="1200"/>
+            </a:lvl1pPr>
+          </a:lstStyle>
+          <a:p>
+            <a:endParaRPr lang="en-US"/>
+          </a:p>
+        </p:txBody>
+      </p:sp>
+      <p:sp>
+        <p:nvSpPr>
+          <p:cNvPr id="3" name="Date Placeholder 2"/>
+          <p:cNvSpPr>
+            <a:spLocks noGrp="1"/>
+          </p:cNvSpPr>
+          <p:nvPr>
+            <p:ph type="dt" idx="1"/>
+          </p:nvPr>
+        </p:nvSpPr>
+        <p:spPr>
+          <a:xfrm>
+            <a:off x="3884613" y="0"/>
+            <a:ext cx="2971800" cy="458788"/>
+          </a:xfrm>
+          <a:prstGeom prst="rect">
+            <a:avLst/>
+          </a:prstGeom>
+        </p:spPr>
+        <p:txBody>
+          <a:bodyPr vert="horz" lIns="91440" tIns="45720" rIns="91440" bIns="45720" rtlCol="0"/>
+          <a:lstStyle>
+            <a:lvl1pPr algn="r">
+              <a:defRPr sz="1200"/>
+            </a:lvl1pPr>
+          </a:lstStyle>
+          <a:p>
+            <a:fld id="{CFFDCDEF-D36E-D547-B508-75F57F9CB5C6}" type="datetimeFigureOut">
+              <a:rPr lang="en-US" smtClean="0"/>
+              <a:t>10/28/20</a:t>
+            </a:fld>
+            <a:endParaRPr lang="en-US"/>
+          </a:p>
+        </p:txBody>
+      </p:sp>
+      <p:sp>
+        <p:nvSpPr>
+          <p:cNvPr id="4" name="Slide Image Placeholder 3"/>
+          <p:cNvSpPr>
+            <a:spLocks noGrp="1" noRot="1" noChangeAspect="1"/>
+          </p:cNvSpPr>
+          <p:nvPr>
+            <p:ph type="sldImg" idx="2"/>
+          </p:nvPr>
+        </p:nvSpPr>
+        <p:spPr>
+          <a:xfrm>
+            <a:off x="685800" y="1143000"/>
+            <a:ext cx="5486400" cy="3086100"/>
+          </a:xfrm>
+          <a:prstGeom prst="rect">
+            <a:avLst/>
+          </a:prstGeom>
+          <a:noFill/>
+          <a:ln w="12700">
+            <a:solidFill>
+              <a:prstClr val="black"/>
+            </a:solidFill>
+          </a:ln>
+        </p:spPr>
+        <p:txBody>
+          <a:bodyPr vert="horz" lIns="91440" tIns="45720" rIns="91440" bIns="45720" rtlCol="0" anchor="ctr"/>
+          <a:lstStyle/>
+          <a:p>
+            <a:endParaRPr lang="en-US"/>
+          </a:p>
+        </p:txBody>
+      </p:sp>
+      <p:sp>
+        <p:nvSpPr>
+          <p:cNvPr id="5" name="Notes Placeholder 4"/>
+          <p:cNvSpPr>
+            <a:spLocks noGrp="1"/>
+          </p:cNvSpPr>
+          <p:nvPr>
+            <p:ph type="body" sz="quarter" idx="3"/>
+          </p:nvPr>
+        </p:nvSpPr>
+        <p:spPr>
+          <a:xfrm>
+            <a:off x="685800" y="4400550"/>
+            <a:ext cx="5486400" cy="3600450"/>
+          </a:xfrm>
+          <a:prstGeom prst="rect">
+            <a:avLst/>
+          </a:prstGeom>
+        </p:spPr>
+        <p:txBody>
+          <a:bodyPr vert="horz" lIns="91440" tIns="45720" rIns="91440" bIns="45720" rtlCol="0"/>
+          <a:lstStyle/>
+          <a:p>
+            <a:pPr lvl="0"/>
+            <a:r>
+              <a:rPr lang="en-US"/>
+              <a:t>Click to edit Master text styles</a:t>
+            </a:r>
+          </a:p>
+          <a:p>
+            <a:pPr lvl="1"/>
+            <a:r>
+              <a:rPr lang="en-US"/>
+              <a:t>Second level</a:t>
+            </a:r>
+          </a:p>
+          <a:p>
+            <a:pPr lvl="2"/>
+            <a:r>
+              <a:rPr lang="en-US"/>
+              <a:t>Third level</a:t>
+            </a:r>
+          </a:p>
+          <a:p>
+            <a:pPr lvl="3"/>
+            <a:r>
+              <a:rPr lang="en-US"/>
+              <a:t>Fourth level</a:t>
+            </a:r>
+          </a:p>
+          <a:p>
+            <a:pPr lvl="4"/>
+            <a:r>
+              <a:rPr lang="en-US"/>
+              <a:t>Fifth level</a:t>
+            </a:r>
+          </a:p>
+        </p:txBody>
+      </p:sp>
+      <p:sp>
+        <p:nvSpPr>
+          <p:cNvPr id="6" name="Footer Placeholder 5"/>
+          <p:cNvSpPr>
+            <a:spLocks noGrp="1"/>
+          </p:cNvSpPr>
+          <p:nvPr>
+            <p:ph type="ftr" sz="quarter" idx="4"/>
+          </p:nvPr>
+        </p:nvSpPr>
+        <p:spPr>
+          <a:xfrm>
+            <a:off x="0" y="8685213"/>
+            <a:ext cx="2971800" cy="458787"/>
+          </a:xfrm>
+          <a:prstGeom prst="rect">
+            <a:avLst/>
+          </a:prstGeom>
+        </p:spPr>
+        <p:txBody>
+          <a:bodyPr vert="horz" lIns="91440" tIns="45720" rIns="91440" bIns="45720" rtlCol="0" anchor="b"/>
+          <a:lstStyle>
+            <a:lvl1pPr algn="l">
+              <a:defRPr sz="1200"/>
+            </a:lvl1pPr>
+          </a:lstStyle>
+          <a:p>
+            <a:endParaRPr lang="en-US"/>
+          </a:p>
+        </p:txBody>
+      </p:sp>
+      <p:sp>
+        <p:nvSpPr>
+          <p:cNvPr id="7" name="Slide Number Placeholder 6"/>
+          <p:cNvSpPr>
+            <a:spLocks noGrp="1"/>
+          </p:cNvSpPr>
+          <p:nvPr>
+            <p:ph type="sldNum" sz="quarter" idx="5"/>
+          </p:nvPr>
+        </p:nvSpPr>
+        <p:spPr>
+          <a:xfrm>
+            <a:off x="3884613" y="8685213"/>
+            <a:ext cx="2971800" cy="458787"/>
+          </a:xfrm>
+          <a:prstGeom prst="rect">
+            <a:avLst/>
+          </a:prstGeom>
+        </p:spPr>
+        <p:txBody>
+          <a:bodyPr vert="horz" lIns="91440" tIns="45720" rIns="91440" bIns="45720" rtlCol="0" anchor="b"/>
+          <a:lstStyle>
+            <a:lvl1pPr algn="r">
+              <a:defRPr sz="1200"/>
+            </a:lvl1pPr>
+          </a:lstStyle>
+          <a:p>
+            <a:fld id="{50B3DFB6-DBA1-4248-8AED-AC7105C00173}" type="slidenum">
+              <a:rPr lang="en-US" smtClean="0"/>
+              <a:t>‹#›</a:t>
+            </a:fld>
+            <a:endParaRPr lang="en-US"/>
+          </a:p>
+        </p:txBody>
+      </p:sp>
+    </p:spTree>
+    <p:extLst>
+      <p:ext uri="{BB962C8B-B14F-4D97-AF65-F5344CB8AC3E}">
+        <p14:creationId xmlns:p14="http://schemas.microsoft.com/office/powerpoint/2010/main" val="1152363857"/>
+      </p:ext>
+    </p:extLst>
+  </p:cSld>
+  <p:clrMap bg1="lt1" tx1="dk1" bg2="lt2" tx2="dk2" accent1="accent1" accent2="accent2" accent3="accent3" accent4="accent4" accent5="accent5" accent6="accent6" hlink="hlink" folHlink="folHlink"/>
+  <p:notesStyle>
+    <a:lvl1pPr marL="0" algn="l" defTabSz="914400" rtl="0" eaLnBrk="1" latinLnBrk="0" hangingPunct="1">
+      <a:defRPr sz="1200" kern="1200">
+        <a:solidFill>
+          <a:schemeClr val="tx1"/>
+        </a:solidFill>
+        <a:latin typeface="+mn-lt"/>
+        <a:ea typeface="+mn-ea"/>
+        <a:cs typeface="+mn-cs"/>
+      </a:defRPr>
+    </a:lvl1pPr>
+    <a:lvl2pPr marL="457200" algn="l" defTabSz="914400" rtl="0" eaLnBrk="1" latinLnBrk="0" hangingPunct="1">
+      <a:defRPr sz="1200" kern="1200">
+        <a:solidFill>
+          <a:schemeClr val="tx1"/>
+        </a:solidFill>
+        <a:latin typeface="+mn-lt"/>
+        <a:ea typeface="+mn-ea"/>
+        <a:cs typeface="+mn-cs"/>
+      </a:defRPr>
+    </a:lvl2pPr>
+    <a:lvl3pPr marL="914400" algn="l" defTabSz="914400" rtl="0" eaLnBrk="1" latinLnBrk="0" hangingPunct="1">
+      <a:defRPr sz="1200" kern="1200">
+        <a:solidFill>
+          <a:schemeClr val="tx1"/>
+        </a:solidFill>
+        <a:latin typeface="+mn-lt"/>
+        <a:ea typeface="+mn-ea"/>
+        <a:cs typeface="+mn-cs"/>
+      </a:defRPr>
+    </a:lvl3pPr>
+    <a:lvl4pPr marL="1371600" algn="l" defTabSz="914400" rtl="0" eaLnBrk="1" latinLnBrk="0" hangingPunct="1">
+      <a:defRPr sz="1200" kern="1200">
+        <a:solidFill>
+          <a:schemeClr val="tx1"/>
+        </a:solidFill>
+        <a:latin typeface="+mn-lt"/>
+        <a:ea typeface="+mn-ea"/>
+        <a:cs typeface="+mn-cs"/>
+      </a:defRPr>
+    </a:lvl4pPr>
+    <a:lvl5pPr marL="1828800" algn="l" defTabSz="914400" rtl="0" eaLnBrk="1" latinLnBrk="0" hangingPunct="1">
+      <a:defRPr sz="1200" kern="1200">
+        <a:solidFill>
+          <a:schemeClr val="tx1"/>
+        </a:solidFill>
+        <a:latin typeface="+mn-lt"/>
+        <a:ea typeface="+mn-ea"/>
+        <a:cs typeface="+mn-cs"/>
+      </a:defRPr>
+    </a:lvl5pPr>
+    <a:lvl6pPr marL="2286000" algn="l" defTabSz="914400" rtl="0" eaLnBrk="1" latinLnBrk="0" hangingPunct="1">
+      <a:defRPr sz="1200" kern="1200">
+        <a:solidFill>
+          <a:schemeClr val="tx1"/>
+        </a:solidFill>
+        <a:latin typeface="+mn-lt"/>
+        <a:ea typeface="+mn-ea"/>
+        <a:cs typeface="+mn-cs"/>
+      </a:defRPr>
+    </a:lvl6pPr>
+    <a:lvl7pPr marL="2743200" algn="l" defTabSz="914400" rtl="0" eaLnBrk="1" latinLnBrk="0" hangingPunct="1">
+      <a:defRPr sz="1200" kern="1200">
+        <a:solidFill>
+          <a:schemeClr val="tx1"/>
+        </a:solidFill>
+        <a:latin typeface="+mn-lt"/>
+        <a:ea typeface="+mn-ea"/>
+        <a:cs typeface="+mn-cs"/>
+      </a:defRPr>
+    </a:lvl7pPr>
+    <a:lvl8pPr marL="3200400" algn="l" defTabSz="914400" rtl="0" eaLnBrk="1" latinLnBrk="0" hangingPunct="1">
+      <a:defRPr sz="1200" kern="1200">
+        <a:solidFill>
+          <a:schemeClr val="tx1"/>
+        </a:solidFill>
+        <a:latin typeface="+mn-lt"/>
+        <a:ea typeface="+mn-ea"/>
+        <a:cs typeface="+mn-cs"/>
+      </a:defRPr>
+    </a:lvl8pPr>
+    <a:lvl9pPr marL="3657600" algn="l" defTabSz="914400" rtl="0" eaLnBrk="1" latinLnBrk="0" hangingPunct="1">
+      <a:defRPr sz="1200" kern="1200">
+        <a:solidFill>
+          <a:schemeClr val="tx1"/>
+        </a:solidFill>
+        <a:latin typeface="+mn-lt"/>
+        <a:ea typeface="+mn-ea"/>
+        <a:cs typeface="+mn-cs"/>
+      </a:defRPr>
+    </a:lvl9pPr>
+  </p:notesStyle>
+</p:notesMaster>
+</file>
+
+<file path=ppt/notesSlides/notesSlide1.xml><?xml version="1.0" encoding="utf-8"?>
+<p:notes xmlns:a="http://schemas.openxmlformats.org/drawingml/2006/main" xmlns:r="http://schemas.openxmlformats.org/officeDocument/2006/relationships" xmlns:p="http://schemas.openxmlformats.org/presentationml/2006/main">
+  <p:cSld>
+    <p:spTree>
+      <p:nvGrpSpPr>
+        <p:cNvPr id="1" name=""/>
+        <p:cNvGrpSpPr/>
+        <p:nvPr/>
+      </p:nvGrpSpPr>
+      <p:grpSpPr>
+        <a:xfrm>
+          <a:off x="0" y="0"/>
+          <a:ext cx="0" cy="0"/>
+          <a:chOff x="0" y="0"/>
+          <a:chExt cx="0" cy="0"/>
+        </a:xfrm>
+      </p:grpSpPr>
+      <p:sp>
+        <p:nvSpPr>
+          <p:cNvPr id="2" name="Slide Image Placeholder 1"/>
+          <p:cNvSpPr>
+            <a:spLocks noGrp="1" noRot="1" noChangeAspect="1"/>
+          </p:cNvSpPr>
+          <p:nvPr>
+            <p:ph type="sldImg"/>
+          </p:nvPr>
+        </p:nvSpPr>
+        <p:spPr/>
+      </p:sp>
+      <p:sp>
+        <p:nvSpPr>
+          <p:cNvPr id="3" name="Notes Placeholder 2"/>
+          <p:cNvSpPr>
+            <a:spLocks noGrp="1"/>
+          </p:cNvSpPr>
+          <p:nvPr>
+            <p:ph type="body" idx="1"/>
+          </p:nvPr>
+        </p:nvSpPr>
+        <p:spPr/>
+        <p:txBody>
+          <a:bodyPr/>
+          <a:lstStyle/>
+          <a:p>
+            <a:endParaRPr lang="en-US" dirty="0"/>
+          </a:p>
+        </p:txBody>
+      </p:sp>
+      <p:sp>
+        <p:nvSpPr>
+          <p:cNvPr id="4" name="Slide Number Placeholder 3"/>
+          <p:cNvSpPr>
+            <a:spLocks noGrp="1"/>
+          </p:cNvSpPr>
+          <p:nvPr>
+            <p:ph type="sldNum" sz="quarter" idx="5"/>
+          </p:nvPr>
+        </p:nvSpPr>
+        <p:spPr/>
+        <p:txBody>
+          <a:bodyPr/>
+          <a:lstStyle/>
+          <a:p>
+            <a:fld id="{50B3DFB6-DBA1-4248-8AED-AC7105C00173}" type="slidenum">
+              <a:rPr lang="en-US" smtClean="0"/>
+              <a:t>5</a:t>
+            </a:fld>
+            <a:endParaRPr lang="en-US"/>
+          </a:p>
+        </p:txBody>
+      </p:sp>
+    </p:spTree>
+    <p:extLst>
+      <p:ext uri="{BB962C8B-B14F-4D97-AF65-F5344CB8AC3E}">
+        <p14:creationId xmlns:p14="http://schemas.microsoft.com/office/powerpoint/2010/main" val="1750580590"/>
+      </p:ext>
+    </p:extLst>
+  </p:cSld>
+  <p:clrMapOvr>
+    <a:masterClrMapping/>
+  </p:clrMapOvr>
+</p:notes>
 </file>
 
 <file path=ppt/slideLayouts/slideLayout1.xml><?xml version="1.0" encoding="utf-8"?>
@@ -261,7 +704,7 @@
           <a:p>
             <a:fld id="{30927A33-7720-8E4A-8F02-67AC114E323C}" type="datetimeFigureOut">
               <a:rPr lang="en-US" smtClean="0"/>
-              <a:t>10/26/20</a:t>
+              <a:t>10/28/20</a:t>
             </a:fld>
             <a:endParaRPr lang="en-US"/>
           </a:p>
@@ -459,7 +902,7 @@
           <a:p>
             <a:fld id="{30927A33-7720-8E4A-8F02-67AC114E323C}" type="datetimeFigureOut">
               <a:rPr lang="en-US" smtClean="0"/>
-              <a:t>10/26/20</a:t>
+              <a:t>10/28/20</a:t>
             </a:fld>
             <a:endParaRPr lang="en-US"/>
           </a:p>
@@ -667,7 +1110,7 @@
           <a:p>
             <a:fld id="{30927A33-7720-8E4A-8F02-67AC114E323C}" type="datetimeFigureOut">
               <a:rPr lang="en-US" smtClean="0"/>
-              <a:t>10/26/20</a:t>
+              <a:t>10/28/20</a:t>
             </a:fld>
             <a:endParaRPr lang="en-US"/>
           </a:p>
@@ -865,7 +1308,7 @@
           <a:p>
             <a:fld id="{30927A33-7720-8E4A-8F02-67AC114E323C}" type="datetimeFigureOut">
               <a:rPr lang="en-US" smtClean="0"/>
-              <a:t>10/26/20</a:t>
+              <a:t>10/28/20</a:t>
             </a:fld>
             <a:endParaRPr lang="en-US"/>
           </a:p>
@@ -1140,7 +1583,7 @@
           <a:p>
             <a:fld id="{30927A33-7720-8E4A-8F02-67AC114E323C}" type="datetimeFigureOut">
               <a:rPr lang="en-US" smtClean="0"/>
-              <a:t>10/26/20</a:t>
+              <a:t>10/28/20</a:t>
             </a:fld>
             <a:endParaRPr lang="en-US"/>
           </a:p>
@@ -1405,7 +1848,7 @@
           <a:p>
             <a:fld id="{30927A33-7720-8E4A-8F02-67AC114E323C}" type="datetimeFigureOut">
               <a:rPr lang="en-US" smtClean="0"/>
-              <a:t>10/26/20</a:t>
+              <a:t>10/28/20</a:t>
             </a:fld>
             <a:endParaRPr lang="en-US"/>
           </a:p>
@@ -1817,7 +2260,7 @@
           <a:p>
             <a:fld id="{30927A33-7720-8E4A-8F02-67AC114E323C}" type="datetimeFigureOut">
               <a:rPr lang="en-US" smtClean="0"/>
-              <a:t>10/26/20</a:t>
+              <a:t>10/28/20</a:t>
             </a:fld>
             <a:endParaRPr lang="en-US"/>
           </a:p>
@@ -1958,7 +2401,7 @@
           <a:p>
             <a:fld id="{30927A33-7720-8E4A-8F02-67AC114E323C}" type="datetimeFigureOut">
               <a:rPr lang="en-US" smtClean="0"/>
-              <a:t>10/26/20</a:t>
+              <a:t>10/28/20</a:t>
             </a:fld>
             <a:endParaRPr lang="en-US"/>
           </a:p>
@@ -2071,7 +2514,7 @@
           <a:p>
             <a:fld id="{30927A33-7720-8E4A-8F02-67AC114E323C}" type="datetimeFigureOut">
               <a:rPr lang="en-US" smtClean="0"/>
-              <a:t>10/26/20</a:t>
+              <a:t>10/28/20</a:t>
             </a:fld>
             <a:endParaRPr lang="en-US"/>
           </a:p>
@@ -2382,7 +2825,7 @@
           <a:p>
             <a:fld id="{30927A33-7720-8E4A-8F02-67AC114E323C}" type="datetimeFigureOut">
               <a:rPr lang="en-US" smtClean="0"/>
-              <a:t>10/26/20</a:t>
+              <a:t>10/28/20</a:t>
             </a:fld>
             <a:endParaRPr lang="en-US"/>
           </a:p>
@@ -2670,7 +3113,7 @@
           <a:p>
             <a:fld id="{30927A33-7720-8E4A-8F02-67AC114E323C}" type="datetimeFigureOut">
               <a:rPr lang="en-US" smtClean="0"/>
-              <a:t>10/26/20</a:t>
+              <a:t>10/28/20</a:t>
             </a:fld>
             <a:endParaRPr lang="en-US"/>
           </a:p>
@@ -2911,7 +3354,7 @@
           <a:p>
             <a:fld id="{30927A33-7720-8E4A-8F02-67AC114E323C}" type="datetimeFigureOut">
               <a:rPr lang="en-US" smtClean="0"/>
-              <a:t>10/26/20</a:t>
+              <a:t>10/28/20</a:t>
             </a:fld>
             <a:endParaRPr lang="en-US"/>
           </a:p>
@@ -3458,6 +3901,179 @@
 </p:sld>
 </file>
 
+<file path=ppt/slides/slide10.xml><?xml version="1.0" encoding="utf-8"?>
+<p:sld xmlns:a="http://schemas.openxmlformats.org/drawingml/2006/main" xmlns:r="http://schemas.openxmlformats.org/officeDocument/2006/relationships" xmlns:p="http://schemas.openxmlformats.org/presentationml/2006/main">
+  <p:cSld>
+    <p:spTree>
+      <p:nvGrpSpPr>
+        <p:cNvPr id="1" name=""/>
+        <p:cNvGrpSpPr/>
+        <p:nvPr/>
+      </p:nvGrpSpPr>
+      <p:grpSpPr>
+        <a:xfrm>
+          <a:off x="0" y="0"/>
+          <a:ext cx="0" cy="0"/>
+          <a:chOff x="0" y="0"/>
+          <a:chExt cx="0" cy="0"/>
+        </a:xfrm>
+      </p:grpSpPr>
+      <p:sp>
+        <p:nvSpPr>
+          <p:cNvPr id="2" name="Title 1">
+            <a:extLst>
+              <a:ext uri="{FF2B5EF4-FFF2-40B4-BE49-F238E27FC236}">
+                <a16:creationId xmlns:a16="http://schemas.microsoft.com/office/drawing/2014/main" id="{D7FC21B0-D9F2-CA48-BE37-B0C7B5AE9F8B}"/>
+              </a:ext>
+            </a:extLst>
+          </p:cNvPr>
+          <p:cNvSpPr>
+            <a:spLocks noGrp="1"/>
+          </p:cNvSpPr>
+          <p:nvPr>
+            <p:ph type="title"/>
+          </p:nvPr>
+        </p:nvSpPr>
+        <p:spPr/>
+        <p:txBody>
+          <a:bodyPr/>
+          <a:lstStyle/>
+          <a:p>
+            <a:r>
+              <a:rPr lang="en-US" dirty="0"/>
+              <a:t>DATA OBSERVATIONS</a:t>
+            </a:r>
+          </a:p>
+        </p:txBody>
+      </p:sp>
+      <p:sp>
+        <p:nvSpPr>
+          <p:cNvPr id="3" name="Content Placeholder 2">
+            <a:extLst>
+              <a:ext uri="{FF2B5EF4-FFF2-40B4-BE49-F238E27FC236}">
+                <a16:creationId xmlns:a16="http://schemas.microsoft.com/office/drawing/2014/main" id="{A80CE486-67B7-0A4F-B2AC-1AF3D0023685}"/>
+              </a:ext>
+            </a:extLst>
+          </p:cNvPr>
+          <p:cNvSpPr>
+            <a:spLocks noGrp="1"/>
+          </p:cNvSpPr>
+          <p:nvPr>
+            <p:ph idx="1"/>
+          </p:nvPr>
+        </p:nvSpPr>
+        <p:spPr/>
+        <p:txBody>
+          <a:bodyPr/>
+          <a:lstStyle/>
+          <a:p>
+            <a:endParaRPr lang="en-US" dirty="0"/>
+          </a:p>
+        </p:txBody>
+      </p:sp>
+      <p:pic>
+        <p:nvPicPr>
+          <p:cNvPr id="4" name="Picture 3">
+            <a:extLst>
+              <a:ext uri="{FF2B5EF4-FFF2-40B4-BE49-F238E27FC236}">
+                <a16:creationId xmlns:a16="http://schemas.microsoft.com/office/drawing/2014/main" id="{8E2C2CC3-87DB-C943-994B-940A23AE07AB}"/>
+              </a:ext>
+            </a:extLst>
+          </p:cNvPr>
+          <p:cNvPicPr>
+            <a:picLocks noChangeAspect="1"/>
+          </p:cNvPicPr>
+          <p:nvPr/>
+        </p:nvPicPr>
+        <p:blipFill>
+          <a:blip r:embed="rId2"/>
+          <a:stretch>
+            <a:fillRect/>
+          </a:stretch>
+        </p:blipFill>
+        <p:spPr>
+          <a:xfrm>
+            <a:off x="943139" y="2535809"/>
+            <a:ext cx="2899775" cy="1986315"/>
+          </a:xfrm>
+          <a:prstGeom prst="rect">
+            <a:avLst/>
+          </a:prstGeom>
+        </p:spPr>
+      </p:pic>
+      <p:pic>
+        <p:nvPicPr>
+          <p:cNvPr id="6" name="Picture 5">
+            <a:extLst>
+              <a:ext uri="{FF2B5EF4-FFF2-40B4-BE49-F238E27FC236}">
+                <a16:creationId xmlns:a16="http://schemas.microsoft.com/office/drawing/2014/main" id="{CB36270F-5593-1047-9A3F-4160E4BF50DE}"/>
+              </a:ext>
+            </a:extLst>
+          </p:cNvPr>
+          <p:cNvPicPr>
+            <a:picLocks noChangeAspect="1"/>
+          </p:cNvPicPr>
+          <p:nvPr/>
+        </p:nvPicPr>
+        <p:blipFill>
+          <a:blip r:embed="rId3"/>
+          <a:stretch>
+            <a:fillRect/>
+          </a:stretch>
+        </p:blipFill>
+        <p:spPr>
+          <a:xfrm>
+            <a:off x="6793976" y="1901858"/>
+            <a:ext cx="2705100" cy="1962150"/>
+          </a:xfrm>
+          <a:prstGeom prst="rect">
+            <a:avLst/>
+          </a:prstGeom>
+        </p:spPr>
+      </p:pic>
+      <p:pic>
+        <p:nvPicPr>
+          <p:cNvPr id="7" name="Picture 6">
+            <a:extLst>
+              <a:ext uri="{FF2B5EF4-FFF2-40B4-BE49-F238E27FC236}">
+                <a16:creationId xmlns:a16="http://schemas.microsoft.com/office/drawing/2014/main" id="{7FCF21DD-DDE5-2C45-B4A9-FB617C391C2C}"/>
+              </a:ext>
+            </a:extLst>
+          </p:cNvPr>
+          <p:cNvPicPr>
+            <a:picLocks noChangeAspect="1"/>
+          </p:cNvPicPr>
+          <p:nvPr/>
+        </p:nvPicPr>
+        <p:blipFill>
+          <a:blip r:embed="rId4"/>
+          <a:stretch>
+            <a:fillRect/>
+          </a:stretch>
+        </p:blipFill>
+        <p:spPr>
+          <a:xfrm>
+            <a:off x="7017469" y="4240395"/>
+            <a:ext cx="2481607" cy="1825754"/>
+          </a:xfrm>
+          <a:prstGeom prst="rect">
+            <a:avLst/>
+          </a:prstGeom>
+        </p:spPr>
+      </p:pic>
+    </p:spTree>
+    <p:extLst>
+      <p:ext uri="{BB962C8B-B14F-4D97-AF65-F5344CB8AC3E}">
+        <p14:creationId xmlns:p14="http://schemas.microsoft.com/office/powerpoint/2010/main" val="1438239426"/>
+      </p:ext>
+    </p:extLst>
+  </p:cSld>
+  <p:clrMapOvr>
+    <a:masterClrMapping/>
+  </p:clrMapOvr>
+</p:sld>
+</file>
+
 <file path=ppt/slides/slide2.xml><?xml version="1.0" encoding="utf-8"?>
 <p:sld xmlns:a="http://schemas.openxmlformats.org/drawingml/2006/main" xmlns:r="http://schemas.openxmlformats.org/officeDocument/2006/relationships" xmlns:p="http://schemas.openxmlformats.org/presentationml/2006/main">
   <p:cSld>
@@ -3535,7 +4151,7 @@
             </a:r>
             <a:r>
               <a:rPr lang="en-US" dirty="0"/>
-              <a:t> Background</a:t>
+              <a:t> BACKGROUND</a:t>
             </a:r>
           </a:p>
           <a:p>
@@ -3554,7 +4170,7 @@
             </a:r>
             <a:r>
               <a:rPr lang="en-US" dirty="0"/>
-              <a:t>Data</a:t>
+              <a:t>DATA</a:t>
             </a:r>
           </a:p>
           <a:p>
@@ -3573,7 +4189,7 @@
             </a:r>
             <a:r>
               <a:rPr lang="en-US" dirty="0"/>
-              <a:t>Natural Language Processing Overview</a:t>
+              <a:t>NATURAL LANGUAGE PROCESSING</a:t>
             </a:r>
           </a:p>
           <a:p>
@@ -3592,7 +4208,7 @@
             </a:r>
             <a:r>
               <a:rPr lang="en-US" dirty="0"/>
-              <a:t>Model Overview</a:t>
+              <a:t>MODEL OVERVIEW</a:t>
             </a:r>
           </a:p>
           <a:p>
@@ -3611,7 +4227,7 @@
             </a:r>
             <a:r>
               <a:rPr lang="en-US" dirty="0"/>
-              <a:t>Model Results</a:t>
+              <a:t>MODEL RESULTS</a:t>
             </a:r>
           </a:p>
           <a:p>
@@ -3630,7 +4246,7 @@
             </a:r>
             <a:r>
               <a:rPr lang="en-US" dirty="0"/>
-              <a:t>Summary &amp; Next Steps</a:t>
+              <a:t>SUMMARY &amp; NEXT STEPS</a:t>
             </a:r>
           </a:p>
         </p:txBody>
@@ -3692,7 +4308,7 @@
             </a:r>
             <a:r>
               <a:rPr lang="en-US" dirty="0"/>
-              <a:t>Background</a:t>
+              <a:t>BACKGROUND</a:t>
             </a:r>
           </a:p>
         </p:txBody>
@@ -3859,7 +4475,7 @@
             </a:r>
             <a:r>
               <a:rPr lang="en-US" dirty="0"/>
-              <a:t>Data Overview</a:t>
+              <a:t>DATA OVERVIEW</a:t>
             </a:r>
           </a:p>
         </p:txBody>
@@ -3894,36 +4510,6 @@
           </a:p>
         </p:txBody>
       </p:sp>
-      <p:pic>
-        <p:nvPicPr>
-          <p:cNvPr id="5" name="Picture 4" descr="Text&#10;&#10;Description automatically generated">
-            <a:extLst>
-              <a:ext uri="{FF2B5EF4-FFF2-40B4-BE49-F238E27FC236}">
-                <a16:creationId xmlns:a16="http://schemas.microsoft.com/office/drawing/2014/main" id="{85A4BD39-48D6-884A-B339-D6B9649FFC33}"/>
-              </a:ext>
-            </a:extLst>
-          </p:cNvPr>
-          <p:cNvPicPr>
-            <a:picLocks noChangeAspect="1"/>
-          </p:cNvPicPr>
-          <p:nvPr/>
-        </p:nvPicPr>
-        <p:blipFill>
-          <a:blip r:embed="rId2"/>
-          <a:stretch>
-            <a:fillRect/>
-          </a:stretch>
-        </p:blipFill>
-        <p:spPr>
-          <a:xfrm>
-            <a:off x="838200" y="3202343"/>
-            <a:ext cx="3168192" cy="2845869"/>
-          </a:xfrm>
-          <a:prstGeom prst="rect">
-            <a:avLst/>
-          </a:prstGeom>
-        </p:spPr>
-      </p:pic>
     </p:spTree>
     <p:extLst>
       <p:ext uri="{BB962C8B-B14F-4D97-AF65-F5344CB8AC3E}">
@@ -3977,7 +4563,7 @@
           <a:p>
             <a:r>
               <a:rPr lang="en-US" dirty="0"/>
-              <a:t>Natural Language Processing</a:t>
+              <a:t>03 NATURAL LANGUAGE PROCESSING</a:t>
             </a:r>
           </a:p>
         </p:txBody>
@@ -4086,8 +4672,12 @@
           <a:lstStyle/>
           <a:p>
             <a:r>
+              <a:rPr lang="en-US" b="1" dirty="0"/>
+              <a:t>04</a:t>
+            </a:r>
+            <a:r>
               <a:rPr lang="en-US" dirty="0"/>
-              <a:t>Model Overview	</a:t>
+              <a:t> MODEL OVERVIEW</a:t>
             </a:r>
           </a:p>
         </p:txBody>
@@ -4190,27 +4780,236 @@
           <a:lstStyle/>
           <a:p>
             <a:r>
+              <a:rPr lang="en-US" b="1" dirty="0"/>
+              <a:t>05 </a:t>
+            </a:r>
+            <a:r>
               <a:rPr lang="en-US" dirty="0"/>
-              <a:t>Model Comparison</a:t>
-            </a:r>
+              <a:t>MODEL COMPARISON [baseline]</a:t>
+            </a:r>
+          </a:p>
+        </p:txBody>
+      </p:sp>
+      <p:sp>
+        <p:nvSpPr>
+          <p:cNvPr id="10" name="TextBox 9">
+            <a:extLst>
+              <a:ext uri="{FF2B5EF4-FFF2-40B4-BE49-F238E27FC236}">
+                <a16:creationId xmlns:a16="http://schemas.microsoft.com/office/drawing/2014/main" id="{581812EE-A15B-0D40-BD24-C1BD3AD9A7CD}"/>
+              </a:ext>
+            </a:extLst>
+          </p:cNvPr>
+          <p:cNvSpPr txBox="1"/>
+          <p:nvPr/>
+        </p:nvSpPr>
+        <p:spPr>
+          <a:xfrm>
+            <a:off x="513441" y="1423161"/>
+            <a:ext cx="3200400" cy="400110"/>
+          </a:xfrm>
+          <a:prstGeom prst="rect">
+            <a:avLst/>
+          </a:prstGeom>
+          <a:solidFill>
+            <a:schemeClr val="bg2">
+              <a:lumMod val="90000"/>
+            </a:schemeClr>
+          </a:solidFill>
+        </p:spPr>
+        <p:txBody>
+          <a:bodyPr wrap="square" rtlCol="0">
+            <a:spAutoFit/>
+          </a:bodyPr>
+          <a:lstStyle/>
+          <a:p>
+            <a:pPr algn="ctr"/>
+            <a:r>
+              <a:rPr lang="en-US" sz="2000" b="1" dirty="0"/>
+              <a:t>Naïve Bayes</a:t>
+            </a:r>
+          </a:p>
+        </p:txBody>
+      </p:sp>
+      <p:sp>
+        <p:nvSpPr>
+          <p:cNvPr id="11" name="TextBox 10">
+            <a:extLst>
+              <a:ext uri="{FF2B5EF4-FFF2-40B4-BE49-F238E27FC236}">
+                <a16:creationId xmlns:a16="http://schemas.microsoft.com/office/drawing/2014/main" id="{D91ACB00-FA4F-7247-8AF6-45CA3A33F527}"/>
+              </a:ext>
+            </a:extLst>
+          </p:cNvPr>
+          <p:cNvSpPr txBox="1"/>
+          <p:nvPr/>
+        </p:nvSpPr>
+        <p:spPr>
+          <a:xfrm>
+            <a:off x="8563509" y="1423161"/>
+            <a:ext cx="3200400" cy="400110"/>
+          </a:xfrm>
+          <a:prstGeom prst="rect">
+            <a:avLst/>
+          </a:prstGeom>
+          <a:solidFill>
+            <a:schemeClr val="bg2">
+              <a:lumMod val="90000"/>
+            </a:schemeClr>
+          </a:solidFill>
+        </p:spPr>
+        <p:txBody>
+          <a:bodyPr wrap="square" rtlCol="0">
+            <a:spAutoFit/>
+          </a:bodyPr>
+          <a:lstStyle/>
+          <a:p>
+            <a:pPr algn="ctr"/>
+            <a:r>
+              <a:rPr lang="en-US" sz="2000" b="1" dirty="0"/>
+              <a:t>Logistic Regression</a:t>
+            </a:r>
+          </a:p>
+        </p:txBody>
+      </p:sp>
+      <p:sp>
+        <p:nvSpPr>
+          <p:cNvPr id="12" name="TextBox 11">
+            <a:extLst>
+              <a:ext uri="{FF2B5EF4-FFF2-40B4-BE49-F238E27FC236}">
+                <a16:creationId xmlns:a16="http://schemas.microsoft.com/office/drawing/2014/main" id="{8CD01200-D758-7F42-8698-85BD5D847EA8}"/>
+              </a:ext>
+            </a:extLst>
+          </p:cNvPr>
+          <p:cNvSpPr txBox="1"/>
+          <p:nvPr/>
+        </p:nvSpPr>
+        <p:spPr>
+          <a:xfrm>
+            <a:off x="4495800" y="1423161"/>
+            <a:ext cx="3200400" cy="402336"/>
+          </a:xfrm>
+          <a:prstGeom prst="rect">
+            <a:avLst/>
+          </a:prstGeom>
+          <a:solidFill>
+            <a:schemeClr val="bg2">
+              <a:lumMod val="90000"/>
+            </a:schemeClr>
+          </a:solidFill>
+        </p:spPr>
+        <p:txBody>
+          <a:bodyPr wrap="square" rtlCol="0">
+            <a:spAutoFit/>
+          </a:bodyPr>
+          <a:lstStyle/>
+          <a:p>
+            <a:pPr algn="ctr"/>
+            <a:r>
+              <a:rPr lang="en-US" sz="2000" b="1" dirty="0"/>
+              <a:t>Support Vector Machines</a:t>
+            </a:r>
+          </a:p>
+        </p:txBody>
+      </p:sp>
+      <p:sp>
+        <p:nvSpPr>
+          <p:cNvPr id="13" name="TextBox 12">
+            <a:extLst>
+              <a:ext uri="{FF2B5EF4-FFF2-40B4-BE49-F238E27FC236}">
+                <a16:creationId xmlns:a16="http://schemas.microsoft.com/office/drawing/2014/main" id="{6A6D7E2E-3819-F742-A043-F81AABC7C3C4}"/>
+              </a:ext>
+            </a:extLst>
+          </p:cNvPr>
+          <p:cNvSpPr txBox="1"/>
+          <p:nvPr/>
+        </p:nvSpPr>
+        <p:spPr>
+          <a:xfrm>
+            <a:off x="449187" y="3771413"/>
+            <a:ext cx="11293625" cy="2308324"/>
+          </a:xfrm>
+          <a:prstGeom prst="rect">
+            <a:avLst/>
+          </a:prstGeom>
+          <a:noFill/>
+        </p:spPr>
+        <p:txBody>
+          <a:bodyPr wrap="square" rtlCol="0">
+            <a:spAutoFit/>
+          </a:bodyPr>
+          <a:lstStyle/>
+          <a:p>
+            <a:endParaRPr lang="en-US" sz="1600" dirty="0"/>
+          </a:p>
+          <a:p>
+            <a:r>
+              <a:rPr lang="en-US" sz="1600" dirty="0"/>
+              <a:t>Best performing model: </a:t>
+            </a:r>
+            <a:r>
+              <a:rPr lang="en-US" sz="1600" b="1" dirty="0"/>
+              <a:t>Logistic Regression</a:t>
+            </a:r>
+          </a:p>
+          <a:p>
+            <a:endParaRPr lang="en-US" sz="1600" b="1" dirty="0"/>
+          </a:p>
+          <a:p>
+            <a:r>
+              <a:rPr lang="en-US" sz="1600" b="1" dirty="0"/>
+              <a:t>Precision</a:t>
+            </a:r>
+            <a:r>
+              <a:rPr lang="en-US" sz="1600" dirty="0"/>
+              <a:t> = 0.92; [i.e. what proportion of predictions for a class are true?]</a:t>
+            </a:r>
+          </a:p>
+          <a:p>
+            <a:r>
+              <a:rPr lang="en-US" sz="1600" b="1" dirty="0"/>
+              <a:t>Recall</a:t>
+            </a:r>
+            <a:r>
+              <a:rPr lang="en-US" sz="1600" dirty="0"/>
+              <a:t> = 0.92; [i.e. what proportion of an actual class are correctly classified?]</a:t>
+            </a:r>
+          </a:p>
+          <a:p>
+            <a:r>
+              <a:rPr lang="en-US" sz="1600" b="1" dirty="0"/>
+              <a:t>Accuracy</a:t>
+            </a:r>
+            <a:r>
+              <a:rPr lang="en-US" sz="1600" dirty="0"/>
+              <a:t> = 0.92; [i.e. what proportion of all classes are correctly classified?]</a:t>
+            </a:r>
+          </a:p>
+          <a:p>
+            <a:endParaRPr lang="en-US" sz="1600" dirty="0"/>
+          </a:p>
+          <a:p>
+            <a:r>
+              <a:rPr lang="en-US" sz="1600" dirty="0"/>
+              <a:t>Some signs of potential overfitting. Training set accuracy of 97%</a:t>
+            </a:r>
+          </a:p>
+          <a:p>
+            <a:endParaRPr lang="en-US" sz="1600" dirty="0"/>
           </a:p>
         </p:txBody>
       </p:sp>
       <p:pic>
         <p:nvPicPr>
-          <p:cNvPr id="5" name="Content Placeholder 4" descr="Calendar&#10;&#10;Description automatically generated">
-            <a:extLst>
-              <a:ext uri="{FF2B5EF4-FFF2-40B4-BE49-F238E27FC236}">
-                <a16:creationId xmlns:a16="http://schemas.microsoft.com/office/drawing/2014/main" id="{21CB9F4D-65BF-574F-B03F-E49E546E2AD6}"/>
+          <p:cNvPr id="6" name="Picture 5" descr="Screen of a cell phone&#10;&#10;Description automatically generated">
+            <a:extLst>
+              <a:ext uri="{FF2B5EF4-FFF2-40B4-BE49-F238E27FC236}">
+                <a16:creationId xmlns:a16="http://schemas.microsoft.com/office/drawing/2014/main" id="{1132CFDC-5F3B-9945-806E-CD32CBD64441}"/>
               </a:ext>
             </a:extLst>
           </p:cNvPr>
           <p:cNvPicPr>
-            <a:picLocks noGrp="1" noChangeAspect="1"/>
+            <a:picLocks noChangeAspect="1"/>
           </p:cNvPicPr>
-          <p:nvPr>
-            <p:ph idx="1"/>
-          </p:nvPr>
+          <p:nvPr/>
         </p:nvPicPr>
         <p:blipFill>
           <a:blip r:embed="rId2"/>
@@ -4220,24 +5019,37 @@
         </p:blipFill>
         <p:spPr>
           <a:xfrm>
-            <a:off x="313544" y="1896798"/>
-            <a:ext cx="3600194" cy="1828800"/>
+            <a:off x="151366" y="1912725"/>
+            <a:ext cx="3753850" cy="1828800"/>
           </a:xfrm>
+          <a:prstGeom prst="rect">
+            <a:avLst/>
+          </a:prstGeom>
+          <a:effectLst>
+            <a:glow rad="101600">
+              <a:schemeClr val="accent3">
+                <a:satMod val="175000"/>
+                <a:alpha val="40000"/>
+              </a:schemeClr>
+            </a:glow>
+          </a:effectLst>
         </p:spPr>
       </p:pic>
       <p:pic>
         <p:nvPicPr>
-          <p:cNvPr id="7" name="Picture 6" descr="Calendar&#10;&#10;Description automatically generated">
-            <a:extLst>
-              <a:ext uri="{FF2B5EF4-FFF2-40B4-BE49-F238E27FC236}">
-                <a16:creationId xmlns:a16="http://schemas.microsoft.com/office/drawing/2014/main" id="{5C0FA8B7-9256-0248-B06A-CFA2472D2ED9}"/>
+          <p:cNvPr id="16" name="Content Placeholder 15" descr="Screen of a cell phone&#10;&#10;Description automatically generated">
+            <a:extLst>
+              <a:ext uri="{FF2B5EF4-FFF2-40B4-BE49-F238E27FC236}">
+                <a16:creationId xmlns:a16="http://schemas.microsoft.com/office/drawing/2014/main" id="{FDD038B5-7E20-0843-BEA8-0FEEE5817594}"/>
               </a:ext>
             </a:extLst>
           </p:cNvPr>
           <p:cNvPicPr>
-            <a:picLocks noChangeAspect="1"/>
+            <a:picLocks noGrp="1" noChangeAspect="1"/>
           </p:cNvPicPr>
-          <p:nvPr/>
+          <p:nvPr>
+            <p:ph idx="1"/>
+          </p:nvPr>
         </p:nvPicPr>
         <p:blipFill>
           <a:blip r:embed="rId3"/>
@@ -4247,20 +5059,25 @@
         </p:blipFill>
         <p:spPr>
           <a:xfrm>
-            <a:off x="4360156" y="1896798"/>
-            <a:ext cx="3600195" cy="1828800"/>
+            <a:off x="4219075" y="1912725"/>
+            <a:ext cx="3753850" cy="1828800"/>
           </a:xfrm>
-          <a:prstGeom prst="rect">
-            <a:avLst/>
-          </a:prstGeom>
+          <a:effectLst>
+            <a:glow rad="101600">
+              <a:schemeClr val="accent3">
+                <a:satMod val="175000"/>
+                <a:alpha val="40000"/>
+              </a:schemeClr>
+            </a:glow>
+          </a:effectLst>
         </p:spPr>
       </p:pic>
       <p:pic>
         <p:nvPicPr>
-          <p:cNvPr id="9" name="Picture 8" descr="Calendar&#10;&#10;Description automatically generated">
-            <a:extLst>
-              <a:ext uri="{FF2B5EF4-FFF2-40B4-BE49-F238E27FC236}">
-                <a16:creationId xmlns:a16="http://schemas.microsoft.com/office/drawing/2014/main" id="{7CAA3AC1-0847-B740-8621-2EDDCE8272F1}"/>
+          <p:cNvPr id="18" name="Picture 17" descr="Calendar&#10;&#10;Description automatically generated">
+            <a:extLst>
+              <a:ext uri="{FF2B5EF4-FFF2-40B4-BE49-F238E27FC236}">
+                <a16:creationId xmlns:a16="http://schemas.microsoft.com/office/drawing/2014/main" id="{E1EE538F-5D82-214C-90BD-54A388CFE201}"/>
               </a:ext>
             </a:extLst>
           </p:cNvPr>
@@ -4277,14 +5094,100 @@
         </p:blipFill>
         <p:spPr>
           <a:xfrm>
-            <a:off x="8406769" y="1896798"/>
-            <a:ext cx="3600195" cy="1828800"/>
+            <a:off x="8286784" y="1912725"/>
+            <a:ext cx="3753850" cy="1828800"/>
+          </a:xfrm>
+          <a:prstGeom prst="rect">
+            <a:avLst/>
+          </a:prstGeom>
+          <a:effectLst>
+            <a:glow rad="63500">
+              <a:schemeClr val="accent3">
+                <a:satMod val="175000"/>
+                <a:alpha val="40000"/>
+              </a:schemeClr>
+            </a:glow>
+          </a:effectLst>
+        </p:spPr>
+      </p:pic>
+      <p:pic>
+        <p:nvPicPr>
+          <p:cNvPr id="20" name="Picture 19" descr="Screen of a cell phone&#10;&#10;Description automatically generated">
+            <a:extLst>
+              <a:ext uri="{FF2B5EF4-FFF2-40B4-BE49-F238E27FC236}">
+                <a16:creationId xmlns:a16="http://schemas.microsoft.com/office/drawing/2014/main" id="{68412E2B-5F19-FA4B-96DD-B2EA5878667A}"/>
+              </a:ext>
+            </a:extLst>
+          </p:cNvPr>
+          <p:cNvPicPr>
+            <a:picLocks noChangeAspect="1"/>
+          </p:cNvPicPr>
+          <p:nvPr/>
+        </p:nvPicPr>
+        <p:blipFill>
+          <a:blip r:embed="rId5"/>
+          <a:stretch>
+            <a:fillRect/>
+          </a:stretch>
+        </p:blipFill>
+        <p:spPr>
+          <a:xfrm>
+            <a:off x="8286784" y="3993450"/>
+            <a:ext cx="3767328" cy="1828800"/>
           </a:xfrm>
           <a:prstGeom prst="rect">
             <a:avLst/>
           </a:prstGeom>
         </p:spPr>
       </p:pic>
+      <p:sp>
+        <p:nvSpPr>
+          <p:cNvPr id="21" name="Rectangle 20">
+            <a:extLst>
+              <a:ext uri="{FF2B5EF4-FFF2-40B4-BE49-F238E27FC236}">
+                <a16:creationId xmlns:a16="http://schemas.microsoft.com/office/drawing/2014/main" id="{3158C142-D59E-D243-A82A-6C20ED7D397E}"/>
+              </a:ext>
+            </a:extLst>
+          </p:cNvPr>
+          <p:cNvSpPr/>
+          <p:nvPr/>
+        </p:nvSpPr>
+        <p:spPr>
+          <a:xfrm>
+            <a:off x="8136836" y="1298713"/>
+            <a:ext cx="3998924" cy="4638261"/>
+          </a:xfrm>
+          <a:prstGeom prst="rect">
+            <a:avLst/>
+          </a:prstGeom>
+          <a:noFill/>
+          <a:ln w="34925"/>
+        </p:spPr>
+        <p:style>
+          <a:lnRef idx="2">
+            <a:schemeClr val="accent1">
+              <a:shade val="50000"/>
+            </a:schemeClr>
+          </a:lnRef>
+          <a:fillRef idx="1">
+            <a:schemeClr val="accent1"/>
+          </a:fillRef>
+          <a:effectRef idx="0">
+            <a:schemeClr val="accent1"/>
+          </a:effectRef>
+          <a:fontRef idx="minor">
+            <a:schemeClr val="lt1"/>
+          </a:fontRef>
+        </p:style>
+        <p:txBody>
+          <a:bodyPr rtlCol="0" anchor="ctr"/>
+          <a:lstStyle/>
+          <a:p>
+            <a:pPr algn="ctr"/>
+            <a:endParaRPr lang="en-US"/>
+          </a:p>
+        </p:txBody>
+      </p:sp>
     </p:spTree>
     <p:extLst>
       <p:ext uri="{BB962C8B-B14F-4D97-AF65-F5344CB8AC3E}">
@@ -4336,7 +5239,10 @@
           <a:bodyPr/>
           <a:lstStyle/>
           <a:p>
-            <a:endParaRPr lang="en-US"/>
+            <a:r>
+              <a:rPr lang="en-US" dirty="0"/>
+              <a:t>DATA OBSERVATIONS</a:t>
+            </a:r>
           </a:p>
         </p:txBody>
       </p:sp>
@@ -4459,6 +5365,156 @@
     <p:extLst>
       <p:ext uri="{BB962C8B-B14F-4D97-AF65-F5344CB8AC3E}">
         <p14:creationId xmlns:p14="http://schemas.microsoft.com/office/powerpoint/2010/main" val="3457639052"/>
+      </p:ext>
+    </p:extLst>
+  </p:cSld>
+  <p:clrMapOvr>
+    <a:masterClrMapping/>
+  </p:clrMapOvr>
+</p:sld>
+</file>
+
+<file path=ppt/slides/slide9.xml><?xml version="1.0" encoding="utf-8"?>
+<p:sld xmlns:a="http://schemas.openxmlformats.org/drawingml/2006/main" xmlns:r="http://schemas.openxmlformats.org/officeDocument/2006/relationships" xmlns:p="http://schemas.openxmlformats.org/presentationml/2006/main">
+  <p:cSld>
+    <p:spTree>
+      <p:nvGrpSpPr>
+        <p:cNvPr id="1" name=""/>
+        <p:cNvGrpSpPr/>
+        <p:nvPr/>
+      </p:nvGrpSpPr>
+      <p:grpSpPr>
+        <a:xfrm>
+          <a:off x="0" y="0"/>
+          <a:ext cx="0" cy="0"/>
+          <a:chOff x="0" y="0"/>
+          <a:chExt cx="0" cy="0"/>
+        </a:xfrm>
+      </p:grpSpPr>
+      <p:sp>
+        <p:nvSpPr>
+          <p:cNvPr id="2" name="Title 1">
+            <a:extLst>
+              <a:ext uri="{FF2B5EF4-FFF2-40B4-BE49-F238E27FC236}">
+                <a16:creationId xmlns:a16="http://schemas.microsoft.com/office/drawing/2014/main" id="{D7FC21B0-D9F2-CA48-BE37-B0C7B5AE9F8B}"/>
+              </a:ext>
+            </a:extLst>
+          </p:cNvPr>
+          <p:cNvSpPr>
+            <a:spLocks noGrp="1"/>
+          </p:cNvSpPr>
+          <p:nvPr>
+            <p:ph type="title"/>
+          </p:nvPr>
+        </p:nvSpPr>
+        <p:spPr/>
+        <p:txBody>
+          <a:bodyPr/>
+          <a:lstStyle/>
+          <a:p>
+            <a:r>
+              <a:rPr lang="en-US" dirty="0"/>
+              <a:t>INSPECTIONS DATA [observations]</a:t>
+            </a:r>
+          </a:p>
+        </p:txBody>
+      </p:sp>
+      <p:pic>
+        <p:nvPicPr>
+          <p:cNvPr id="8" name="slide5" descr="Year (Through September)">
+            <a:extLst>
+              <a:ext uri="{FF2B5EF4-FFF2-40B4-BE49-F238E27FC236}">
+                <a16:creationId xmlns:a16="http://schemas.microsoft.com/office/drawing/2014/main" id="{6C7D0847-D7E9-8A43-A78E-1A12F26A48B1}"/>
+              </a:ext>
+            </a:extLst>
+          </p:cNvPr>
+          <p:cNvPicPr>
+            <a:picLocks noChangeAspect="1"/>
+          </p:cNvPicPr>
+          <p:nvPr/>
+        </p:nvPicPr>
+        <p:blipFill>
+          <a:blip r:embed="rId2">
+            <a:extLst>
+              <a:ext uri="{28A0092B-C50C-407E-A947-70E740481C1C}">
+                <a14:useLocalDpi xmlns:a14="http://schemas.microsoft.com/office/drawing/2010/main" val="0"/>
+              </a:ext>
+            </a:extLst>
+          </a:blip>
+          <a:stretch>
+            <a:fillRect/>
+          </a:stretch>
+        </p:blipFill>
+        <p:spPr>
+          <a:xfrm>
+            <a:off x="347870" y="1723268"/>
+            <a:ext cx="6490252" cy="4769607"/>
+          </a:xfrm>
+          <a:prstGeom prst="rect">
+            <a:avLst/>
+          </a:prstGeom>
+        </p:spPr>
+      </p:pic>
+      <p:sp>
+        <p:nvSpPr>
+          <p:cNvPr id="5" name="TextBox 4">
+            <a:extLst>
+              <a:ext uri="{FF2B5EF4-FFF2-40B4-BE49-F238E27FC236}">
+                <a16:creationId xmlns:a16="http://schemas.microsoft.com/office/drawing/2014/main" id="{EB9FAA8D-1996-004C-9316-4C9D9842CF22}"/>
+              </a:ext>
+            </a:extLst>
+          </p:cNvPr>
+          <p:cNvSpPr txBox="1"/>
+          <p:nvPr/>
+        </p:nvSpPr>
+        <p:spPr>
+          <a:xfrm>
+            <a:off x="7063409" y="1457739"/>
+            <a:ext cx="4969565" cy="2308324"/>
+          </a:xfrm>
+          <a:prstGeom prst="rect">
+            <a:avLst/>
+          </a:prstGeom>
+          <a:noFill/>
+        </p:spPr>
+        <p:txBody>
+          <a:bodyPr wrap="square" rtlCol="0">
+            <a:spAutoFit/>
+          </a:bodyPr>
+          <a:lstStyle/>
+          <a:p>
+            <a:r>
+              <a:rPr lang="en-US" dirty="0"/>
+              <a:t>Total number of inspections, through September of all years, are down in 2020.</a:t>
+            </a:r>
+          </a:p>
+          <a:p>
+            <a:endParaRPr lang="en-US" dirty="0"/>
+          </a:p>
+          <a:p>
+            <a:r>
+              <a:rPr lang="en-US" dirty="0"/>
+              <a:t>Inspections peaked in 2016.</a:t>
+            </a:r>
+          </a:p>
+          <a:p>
+            <a:endParaRPr lang="en-US" dirty="0"/>
+          </a:p>
+          <a:p>
+            <a:r>
+              <a:rPr lang="en-US" dirty="0"/>
+              <a:t>Significantly more pass with conditions results in 2019</a:t>
+            </a:r>
+          </a:p>
+          <a:p>
+            <a:endParaRPr lang="en-US" dirty="0"/>
+          </a:p>
+        </p:txBody>
+      </p:sp>
+    </p:spTree>
+    <p:extLst>
+      <p:ext uri="{BB962C8B-B14F-4D97-AF65-F5344CB8AC3E}">
+        <p14:creationId xmlns:p14="http://schemas.microsoft.com/office/powerpoint/2010/main" val="704444123"/>
       </p:ext>
     </p:extLst>
   </p:cSld>
@@ -4761,4 +5817,299 @@
     </a:ext>
   </a:extLst>
 </a:theme>
+</file>
+
+<file path=ppt/theme/theme2.xml><?xml version="1.0" encoding="utf-8"?>
+<a:theme xmlns:a="http://schemas.openxmlformats.org/drawingml/2006/main" name="Office Theme">
+  <a:themeElements>
+    <a:clrScheme name="Office">
+      <a:dk1>
+        <a:sysClr val="windowText" lastClr="000000"/>
+      </a:dk1>
+      <a:lt1>
+        <a:sysClr val="window" lastClr="FFFFFF"/>
+      </a:lt1>
+      <a:dk2>
+        <a:srgbClr val="44546A"/>
+      </a:dk2>
+      <a:lt2>
+        <a:srgbClr val="E7E6E6"/>
+      </a:lt2>
+      <a:accent1>
+        <a:srgbClr val="4472C4"/>
+      </a:accent1>
+      <a:accent2>
+        <a:srgbClr val="ED7D31"/>
+      </a:accent2>
+      <a:accent3>
+        <a:srgbClr val="A5A5A5"/>
+      </a:accent3>
+      <a:accent4>
+        <a:srgbClr val="FFC000"/>
+      </a:accent4>
+      <a:accent5>
+        <a:srgbClr val="5B9BD5"/>
+      </a:accent5>
+      <a:accent6>
+        <a:srgbClr val="70AD47"/>
+      </a:accent6>
+      <a:hlink>
+        <a:srgbClr val="0563C1"/>
+      </a:hlink>
+      <a:folHlink>
+        <a:srgbClr val="954F72"/>
+      </a:folHlink>
+    </a:clrScheme>
+    <a:fontScheme name="Office">
+      <a:majorFont>
+        <a:latin typeface="Calibri Light" panose="020F0302020204030204"/>
+        <a:ea typeface=""/>
+        <a:cs typeface=""/>
+        <a:font script="Jpan" typeface="游ゴシック Light"/>
+        <a:font script="Hang" typeface="맑은 고딕"/>
+        <a:font script="Hans" typeface="等线 Light"/>
+        <a:font script="Hant" typeface="新細明體"/>
+        <a:font script="Arab" typeface="Times New Roman"/>
+        <a:font script="Hebr" typeface="Times New Roman"/>
+        <a:font script="Thai" typeface="Angsana New"/>
+        <a:font script="Ethi" typeface="Nyala"/>
+        <a:font script="Beng" typeface="Vrinda"/>
+        <a:font script="Gujr" typeface="Shruti"/>
+        <a:font script="Khmr" typeface="MoolBoran"/>
+        <a:font script="Knda" typeface="Tunga"/>
+        <a:font script="Guru" typeface="Raavi"/>
+        <a:font script="Cans" typeface="Euphemia"/>
+        <a:font script="Cher" typeface="Plantagenet Cherokee"/>
+        <a:font script="Yiii" typeface="Microsoft Yi Baiti"/>
+        <a:font script="Tibt" typeface="Microsoft Himalaya"/>
+        <a:font script="Thaa" typeface="MV Boli"/>
+        <a:font script="Deva" typeface="Mangal"/>
+        <a:font script="Telu" typeface="Gautami"/>
+        <a:font script="Taml" typeface="Latha"/>
+        <a:font script="Syrc" typeface="Estrangelo Edessa"/>
+        <a:font script="Orya" typeface="Kalinga"/>
+        <a:font script="Mlym" typeface="Kartika"/>
+        <a:font script="Laoo" typeface="DokChampa"/>
+        <a:font script="Sinh" typeface="Iskoola Pota"/>
+        <a:font script="Mong" typeface="Mongolian Baiti"/>
+        <a:font script="Viet" typeface="Times New Roman"/>
+        <a:font script="Uigh" typeface="Microsoft Uighur"/>
+        <a:font script="Geor" typeface="Sylfaen"/>
+        <a:font script="Armn" typeface="Arial"/>
+        <a:font script="Bugi" typeface="Leelawadee UI"/>
+        <a:font script="Bopo" typeface="Microsoft JhengHei"/>
+        <a:font script="Java" typeface="Javanese Text"/>
+        <a:font script="Lisu" typeface="Segoe UI"/>
+        <a:font script="Mymr" typeface="Myanmar Text"/>
+        <a:font script="Nkoo" typeface="Ebrima"/>
+        <a:font script="Olck" typeface="Nirmala UI"/>
+        <a:font script="Osma" typeface="Ebrima"/>
+        <a:font script="Phag" typeface="Phagspa"/>
+        <a:font script="Syrn" typeface="Estrangelo Edessa"/>
+        <a:font script="Syrj" typeface="Estrangelo Edessa"/>
+        <a:font script="Syre" typeface="Estrangelo Edessa"/>
+        <a:font script="Sora" typeface="Nirmala UI"/>
+        <a:font script="Tale" typeface="Microsoft Tai Le"/>
+        <a:font script="Talu" typeface="Microsoft New Tai Lue"/>
+        <a:font script="Tfng" typeface="Ebrima"/>
+      </a:majorFont>
+      <a:minorFont>
+        <a:latin typeface="Calibri" panose="020F0502020204030204"/>
+        <a:ea typeface=""/>
+        <a:cs typeface=""/>
+        <a:font script="Jpan" typeface="游ゴシック"/>
+        <a:font script="Hang" typeface="맑은 고딕"/>
+        <a:font script="Hans" typeface="等线"/>
+        <a:font script="Hant" typeface="新細明體"/>
+        <a:font script="Arab" typeface="Arial"/>
+        <a:font script="Hebr" typeface="Arial"/>
+        <a:font script="Thai" typeface="Cordia New"/>
+        <a:font script="Ethi" typeface="Nyala"/>
+        <a:font script="Beng" typeface="Vrinda"/>
+        <a:font script="Gujr" typeface="Shruti"/>
+        <a:font script="Khmr" typeface="DaunPenh"/>
+        <a:font script="Knda" typeface="Tunga"/>
+        <a:font script="Guru" typeface="Raavi"/>
+        <a:font script="Cans" typeface="Euphemia"/>
+        <a:font script="Cher" typeface="Plantagenet Cherokee"/>
+        <a:font script="Yiii" typeface="Microsoft Yi Baiti"/>
+        <a:font script="Tibt" typeface="Microsoft Himalaya"/>
+        <a:font script="Thaa" typeface="MV Boli"/>
+        <a:font script="Deva" typeface="Mangal"/>
+        <a:font script="Telu" typeface="Gautami"/>
+        <a:font script="Taml" typeface="Latha"/>
+        <a:font script="Syrc" typeface="Estrangelo Edessa"/>
+        <a:font script="Orya" typeface="Kalinga"/>
+        <a:font script="Mlym" typeface="Kartika"/>
+        <a:font script="Laoo" typeface="DokChampa"/>
+        <a:font script="Sinh" typeface="Iskoola Pota"/>
+        <a:font script="Mong" typeface="Mongolian Baiti"/>
+        <a:font script="Viet" typeface="Arial"/>
+        <a:font script="Uigh" typeface="Microsoft Uighur"/>
+        <a:font script="Geor" typeface="Sylfaen"/>
+        <a:font script="Armn" typeface="Arial"/>
+        <a:font script="Bugi" typeface="Leelawadee UI"/>
+        <a:font script="Bopo" typeface="Microsoft JhengHei"/>
+        <a:font script="Java" typeface="Javanese Text"/>
+        <a:font script="Lisu" typeface="Segoe UI"/>
+        <a:font script="Mymr" typeface="Myanmar Text"/>
+        <a:font script="Nkoo" typeface="Ebrima"/>
+        <a:font script="Olck" typeface="Nirmala UI"/>
+        <a:font script="Osma" typeface="Ebrima"/>
+        <a:font script="Phag" typeface="Phagspa"/>
+        <a:font script="Syrn" typeface="Estrangelo Edessa"/>
+        <a:font script="Syrj" typeface="Estrangelo Edessa"/>
+        <a:font script="Syre" typeface="Estrangelo Edessa"/>
+        <a:font script="Sora" typeface="Nirmala UI"/>
+        <a:font script="Tale" typeface="Microsoft Tai Le"/>
+        <a:font script="Talu" typeface="Microsoft New Tai Lue"/>
+        <a:font script="Tfng" typeface="Ebrima"/>
+      </a:minorFont>
+    </a:fontScheme>
+    <a:fmtScheme name="Office">
+      <a:fillStyleLst>
+        <a:solidFill>
+          <a:schemeClr val="phClr"/>
+        </a:solidFill>
+        <a:gradFill rotWithShape="1">
+          <a:gsLst>
+            <a:gs pos="0">
+              <a:schemeClr val="phClr">
+                <a:lumMod val="110000"/>
+                <a:satMod val="105000"/>
+                <a:tint val="67000"/>
+              </a:schemeClr>
+            </a:gs>
+            <a:gs pos="50000">
+              <a:schemeClr val="phClr">
+                <a:lumMod val="105000"/>
+                <a:satMod val="103000"/>
+                <a:tint val="73000"/>
+              </a:schemeClr>
+            </a:gs>
+            <a:gs pos="100000">
+              <a:schemeClr val="phClr">
+                <a:lumMod val="105000"/>
+                <a:satMod val="109000"/>
+                <a:tint val="81000"/>
+              </a:schemeClr>
+            </a:gs>
+          </a:gsLst>
+          <a:lin ang="5400000" scaled="0"/>
+        </a:gradFill>
+        <a:gradFill rotWithShape="1">
+          <a:gsLst>
+            <a:gs pos="0">
+              <a:schemeClr val="phClr">
+                <a:satMod val="103000"/>
+                <a:lumMod val="102000"/>
+                <a:tint val="94000"/>
+              </a:schemeClr>
+            </a:gs>
+            <a:gs pos="50000">
+              <a:schemeClr val="phClr">
+                <a:satMod val="110000"/>
+                <a:lumMod val="100000"/>
+                <a:shade val="100000"/>
+              </a:schemeClr>
+            </a:gs>
+            <a:gs pos="100000">
+              <a:schemeClr val="phClr">
+                <a:lumMod val="99000"/>
+                <a:satMod val="120000"/>
+                <a:shade val="78000"/>
+              </a:schemeClr>
+            </a:gs>
+          </a:gsLst>
+          <a:lin ang="5400000" scaled="0"/>
+        </a:gradFill>
+      </a:fillStyleLst>
+      <a:lnStyleLst>
+        <a:ln w="6350" cap="flat" cmpd="sng" algn="ctr">
+          <a:solidFill>
+            <a:schemeClr val="phClr"/>
+          </a:solidFill>
+          <a:prstDash val="solid"/>
+          <a:miter lim="800000"/>
+        </a:ln>
+        <a:ln w="12700" cap="flat" cmpd="sng" algn="ctr">
+          <a:solidFill>
+            <a:schemeClr val="phClr"/>
+          </a:solidFill>
+          <a:prstDash val="solid"/>
+          <a:miter lim="800000"/>
+        </a:ln>
+        <a:ln w="19050" cap="flat" cmpd="sng" algn="ctr">
+          <a:solidFill>
+            <a:schemeClr val="phClr"/>
+          </a:solidFill>
+          <a:prstDash val="solid"/>
+          <a:miter lim="800000"/>
+        </a:ln>
+      </a:lnStyleLst>
+      <a:effectStyleLst>
+        <a:effectStyle>
+          <a:effectLst/>
+        </a:effectStyle>
+        <a:effectStyle>
+          <a:effectLst/>
+        </a:effectStyle>
+        <a:effectStyle>
+          <a:effectLst>
+            <a:outerShdw blurRad="57150" dist="19050" dir="5400000" algn="ctr" rotWithShape="0">
+              <a:srgbClr val="000000">
+                <a:alpha val="63000"/>
+              </a:srgbClr>
+            </a:outerShdw>
+          </a:effectLst>
+        </a:effectStyle>
+      </a:effectStyleLst>
+      <a:bgFillStyleLst>
+        <a:solidFill>
+          <a:schemeClr val="phClr"/>
+        </a:solidFill>
+        <a:solidFill>
+          <a:schemeClr val="phClr">
+            <a:tint val="95000"/>
+            <a:satMod val="170000"/>
+          </a:schemeClr>
+        </a:solidFill>
+        <a:gradFill rotWithShape="1">
+          <a:gsLst>
+            <a:gs pos="0">
+              <a:schemeClr val="phClr">
+                <a:tint val="93000"/>
+                <a:satMod val="150000"/>
+                <a:shade val="98000"/>
+                <a:lumMod val="102000"/>
+              </a:schemeClr>
+            </a:gs>
+            <a:gs pos="50000">
+              <a:schemeClr val="phClr">
+                <a:tint val="98000"/>
+                <a:satMod val="130000"/>
+                <a:shade val="90000"/>
+                <a:lumMod val="103000"/>
+              </a:schemeClr>
+            </a:gs>
+            <a:gs pos="100000">
+              <a:schemeClr val="phClr">
+                <a:shade val="63000"/>
+                <a:satMod val="120000"/>
+              </a:schemeClr>
+            </a:gs>
+          </a:gsLst>
+          <a:lin ang="5400000" scaled="0"/>
+        </a:gradFill>
+      </a:bgFillStyleLst>
+    </a:fmtScheme>
+  </a:themeElements>
+  <a:objectDefaults/>
+  <a:extraClrSchemeLst/>
+  <a:extLst>
+    <a:ext uri="{05A4C25C-085E-4340-85A3-A5531E510DB2}">
+      <thm15:themeFamily xmlns:thm15="http://schemas.microsoft.com/office/thememl/2012/main" name="Office Theme" id="{62F939B6-93AF-4DB8-9C6B-D6C7DFDC589F}" vid="{4A3C46E8-61CC-4603-A589-7422A47A8E4A}"/>
+    </a:ext>
+  </a:extLst>
+</a:theme>
 </file>
</xml_diff>